<commit_message>
after removing comp @7pm
</commit_message>
<xml_diff>
--- a/Capgemini Cafe_FSSBMS.pptx
+++ b/Capgemini Cafe_FSSBMS.pptx
@@ -2,13 +2,14 @@
 <file path=ppt/presentation.xml><?xml version="1.0" encoding="utf-8"?>
 <p:presentation xmlns:a="http://schemas.openxmlformats.org/drawingml/2006/main" xmlns:r="http://schemas.openxmlformats.org/officeDocument/2006/relationships" xmlns:p="http://schemas.openxmlformats.org/presentationml/2006/main" saveSubsetFonts="1">
   <p:sldMasterIdLst>
-    <p:sldMasterId id="2147483648" r:id="rId1"/>
+    <p:sldMasterId id="2147483648" r:id="rId4"/>
   </p:sldMasterIdLst>
   <p:sldIdLst>
-    <p:sldId id="256" r:id="rId2"/>
-    <p:sldId id="257" r:id="rId3"/>
-    <p:sldId id="258" r:id="rId4"/>
-    <p:sldId id="259" r:id="rId5"/>
+    <p:sldId id="256" r:id="rId5"/>
+    <p:sldId id="260" r:id="rId6"/>
+    <p:sldId id="257" r:id="rId7"/>
+    <p:sldId id="258" r:id="rId8"/>
+    <p:sldId id="259" r:id="rId9"/>
   </p:sldIdLst>
   <p:sldSz cx="12192000" cy="6858000"/>
   <p:notesSz cx="6858000" cy="9144000"/>
@@ -246,7 +247,7 @@
           <a:p>
             <a:fld id="{7C0B26C8-AEF8-4241-9E2C-86F613903064}" type="datetimeFigureOut">
               <a:rPr lang="en-IN" smtClean="0"/>
-              <a:t>13-05-2020</a:t>
+              <a:t>16-06-2020</a:t>
             </a:fld>
             <a:endParaRPr lang="en-IN"/>
           </a:p>
@@ -416,7 +417,7 @@
           <a:p>
             <a:fld id="{7C0B26C8-AEF8-4241-9E2C-86F613903064}" type="datetimeFigureOut">
               <a:rPr lang="en-IN" smtClean="0"/>
-              <a:t>13-05-2020</a:t>
+              <a:t>16-06-2020</a:t>
             </a:fld>
             <a:endParaRPr lang="en-IN"/>
           </a:p>
@@ -596,7 +597,7 @@
           <a:p>
             <a:fld id="{7C0B26C8-AEF8-4241-9E2C-86F613903064}" type="datetimeFigureOut">
               <a:rPr lang="en-IN" smtClean="0"/>
-              <a:t>13-05-2020</a:t>
+              <a:t>16-06-2020</a:t>
             </a:fld>
             <a:endParaRPr lang="en-IN"/>
           </a:p>
@@ -766,7 +767,7 @@
           <a:p>
             <a:fld id="{7C0B26C8-AEF8-4241-9E2C-86F613903064}" type="datetimeFigureOut">
               <a:rPr lang="en-IN" smtClean="0"/>
-              <a:t>13-05-2020</a:t>
+              <a:t>16-06-2020</a:t>
             </a:fld>
             <a:endParaRPr lang="en-IN"/>
           </a:p>
@@ -1012,7 +1013,7 @@
           <a:p>
             <a:fld id="{7C0B26C8-AEF8-4241-9E2C-86F613903064}" type="datetimeFigureOut">
               <a:rPr lang="en-IN" smtClean="0"/>
-              <a:t>13-05-2020</a:t>
+              <a:t>16-06-2020</a:t>
             </a:fld>
             <a:endParaRPr lang="en-IN"/>
           </a:p>
@@ -1244,7 +1245,7 @@
           <a:p>
             <a:fld id="{7C0B26C8-AEF8-4241-9E2C-86F613903064}" type="datetimeFigureOut">
               <a:rPr lang="en-IN" smtClean="0"/>
-              <a:t>13-05-2020</a:t>
+              <a:t>16-06-2020</a:t>
             </a:fld>
             <a:endParaRPr lang="en-IN"/>
           </a:p>
@@ -1611,7 +1612,7 @@
           <a:p>
             <a:fld id="{7C0B26C8-AEF8-4241-9E2C-86F613903064}" type="datetimeFigureOut">
               <a:rPr lang="en-IN" smtClean="0"/>
-              <a:t>13-05-2020</a:t>
+              <a:t>16-06-2020</a:t>
             </a:fld>
             <a:endParaRPr lang="en-IN"/>
           </a:p>
@@ -1729,7 +1730,7 @@
           <a:p>
             <a:fld id="{7C0B26C8-AEF8-4241-9E2C-86F613903064}" type="datetimeFigureOut">
               <a:rPr lang="en-IN" smtClean="0"/>
-              <a:t>13-05-2020</a:t>
+              <a:t>16-06-2020</a:t>
             </a:fld>
             <a:endParaRPr lang="en-IN"/>
           </a:p>
@@ -1824,7 +1825,7 @@
           <a:p>
             <a:fld id="{7C0B26C8-AEF8-4241-9E2C-86F613903064}" type="datetimeFigureOut">
               <a:rPr lang="en-IN" smtClean="0"/>
-              <a:t>13-05-2020</a:t>
+              <a:t>16-06-2020</a:t>
             </a:fld>
             <a:endParaRPr lang="en-IN"/>
           </a:p>
@@ -2101,7 +2102,7 @@
           <a:p>
             <a:fld id="{7C0B26C8-AEF8-4241-9E2C-86F613903064}" type="datetimeFigureOut">
               <a:rPr lang="en-IN" smtClean="0"/>
-              <a:t>13-05-2020</a:t>
+              <a:t>16-06-2020</a:t>
             </a:fld>
             <a:endParaRPr lang="en-IN"/>
           </a:p>
@@ -2354,7 +2355,7 @@
           <a:p>
             <a:fld id="{7C0B26C8-AEF8-4241-9E2C-86F613903064}" type="datetimeFigureOut">
               <a:rPr lang="en-IN" smtClean="0"/>
-              <a:t>13-05-2020</a:t>
+              <a:t>16-06-2020</a:t>
             </a:fld>
             <a:endParaRPr lang="en-IN"/>
           </a:p>
@@ -2567,7 +2568,7 @@
           <a:p>
             <a:fld id="{7C0B26C8-AEF8-4241-9E2C-86F613903064}" type="datetimeFigureOut">
               <a:rPr lang="en-IN" smtClean="0"/>
-              <a:t>13-05-2020</a:t>
+              <a:t>16-06-2020</a:t>
             </a:fld>
             <a:endParaRPr lang="en-IN"/>
           </a:p>
@@ -3061,104 +3062,52 @@
           <a:bodyPr/>
           <a:lstStyle/>
           <a:p>
+            <a:pPr algn="ctr"/>
             <a:r>
               <a:rPr lang="en-IN" dirty="0" smtClean="0">
                 <a:solidFill>
                   <a:srgbClr val="0070C0"/>
                 </a:solidFill>
               </a:rPr>
-              <a:t>Description</a:t>
-            </a:r>
-            <a:endParaRPr lang="en-IN" dirty="0">
-              <a:solidFill>
-                <a:srgbClr val="0070C0"/>
-              </a:solidFill>
-            </a:endParaRPr>
-          </a:p>
-        </p:txBody>
-      </p:sp>
-      <p:sp>
-        <p:nvSpPr>
-          <p:cNvPr id="3" name="Content Placeholder 2"/>
-          <p:cNvSpPr>
-            <a:spLocks noGrp="1"/>
-          </p:cNvSpPr>
+              <a:t>Our Team</a:t>
+            </a:r>
+            <a:endParaRPr lang="en-IN" dirty="0"/>
+          </a:p>
+        </p:txBody>
+      </p:sp>
+      <p:pic>
+        <p:nvPicPr>
+          <p:cNvPr id="4" name="Content Placeholder 3"/>
+          <p:cNvPicPr>
+            <a:picLocks noGrp="1" noChangeAspect="1"/>
+          </p:cNvPicPr>
           <p:nvPr>
             <p:ph idx="1"/>
           </p:nvPr>
-        </p:nvSpPr>
-        <p:spPr/>
-        <p:txBody>
-          <a:bodyPr/>
-          <a:lstStyle/>
-          <a:p>
-            <a:r>
-              <a:rPr lang="en-IN" dirty="0" smtClean="0"/>
-              <a:t>An application which will be exclusively for </a:t>
-            </a:r>
-            <a:r>
-              <a:rPr lang="en-IN" dirty="0" err="1" smtClean="0"/>
-              <a:t>Capgemini</a:t>
-            </a:r>
-            <a:r>
-              <a:rPr lang="en-IN" dirty="0" smtClean="0"/>
-              <a:t> employees.</a:t>
-            </a:r>
-            <a:endParaRPr lang="en-IN" dirty="0" smtClean="0"/>
-          </a:p>
-          <a:p>
-            <a:r>
-              <a:rPr lang="en-IN" dirty="0" smtClean="0"/>
-              <a:t>Admin must be able to list, update, add and delete the café with the details like name, owner name, location and menu</a:t>
-            </a:r>
-            <a:r>
-              <a:rPr lang="en-IN" dirty="0" smtClean="0"/>
-              <a:t>. </a:t>
-            </a:r>
-            <a:endParaRPr lang="en-IN" dirty="0" smtClean="0"/>
-          </a:p>
-          <a:p>
-            <a:r>
-              <a:rPr lang="en-IN" dirty="0" smtClean="0"/>
-              <a:t>User must be able to view the café list along with the details like location and menu</a:t>
-            </a:r>
-            <a:r>
-              <a:rPr lang="en-IN" dirty="0" smtClean="0"/>
-              <a:t>.</a:t>
-            </a:r>
-            <a:endParaRPr lang="en-IN" dirty="0" smtClean="0"/>
-          </a:p>
-          <a:p>
-            <a:r>
-              <a:rPr lang="en-IN" dirty="0" smtClean="0"/>
-              <a:t>User must be able to sort and fetch café by various details.</a:t>
-            </a:r>
-          </a:p>
-          <a:p>
-            <a:r>
-              <a:rPr lang="en-IN" dirty="0" smtClean="0"/>
-              <a:t>User must be able to access the helpdesk, raise a ticket and view it.</a:t>
-            </a:r>
-          </a:p>
-          <a:p>
-            <a:r>
-              <a:rPr lang="en-IN" dirty="0" smtClean="0"/>
-              <a:t>The cart and payment page must be unique.</a:t>
-            </a:r>
-            <a:endParaRPr lang="en-IN" dirty="0" smtClean="0"/>
-          </a:p>
-          <a:p>
-            <a:endParaRPr lang="en-IN" dirty="0" smtClean="0"/>
-          </a:p>
-          <a:p>
-            <a:endParaRPr lang="en-IN" dirty="0"/>
-          </a:p>
-        </p:txBody>
-      </p:sp>
+        </p:nvPicPr>
+        <p:blipFill>
+          <a:blip r:embed="rId2">
+            <a:extLst>
+              <a:ext uri="{28A0092B-C50C-407E-A947-70E740481C1C}">
+                <a14:useLocalDpi xmlns:a14="http://schemas.microsoft.com/office/drawing/2010/main" val="0"/>
+              </a:ext>
+            </a:extLst>
+          </a:blip>
+          <a:stretch>
+            <a:fillRect/>
+          </a:stretch>
+        </p:blipFill>
+        <p:spPr>
+          <a:xfrm>
+            <a:off x="950565" y="1815737"/>
+            <a:ext cx="10403235" cy="4219303"/>
+          </a:xfrm>
+        </p:spPr>
+      </p:pic>
     </p:spTree>
     <p:extLst>
       <p:ext uri="{BB962C8B-B14F-4D97-AF65-F5344CB8AC3E}">
-        <p14:creationId xmlns:p14="http://schemas.microsoft.com/office/powerpoint/2010/main" val="195370107"/>
+        <p14:creationId xmlns:p14="http://schemas.microsoft.com/office/powerpoint/2010/main" val="1613064789"/>
       </p:ext>
     </p:extLst>
   </p:cSld>
@@ -3206,6 +3155,127 @@
                   <a:srgbClr val="0070C0"/>
                 </a:solidFill>
               </a:rPr>
+              <a:t>Description</a:t>
+            </a:r>
+            <a:endParaRPr lang="en-IN" dirty="0">
+              <a:solidFill>
+                <a:srgbClr val="0070C0"/>
+              </a:solidFill>
+            </a:endParaRPr>
+          </a:p>
+        </p:txBody>
+      </p:sp>
+      <p:sp>
+        <p:nvSpPr>
+          <p:cNvPr id="3" name="Content Placeholder 2"/>
+          <p:cNvSpPr>
+            <a:spLocks noGrp="1"/>
+          </p:cNvSpPr>
+          <p:nvPr>
+            <p:ph idx="1"/>
+          </p:nvPr>
+        </p:nvSpPr>
+        <p:spPr/>
+        <p:txBody>
+          <a:bodyPr/>
+          <a:lstStyle/>
+          <a:p>
+            <a:r>
+              <a:rPr lang="en-IN" dirty="0" smtClean="0"/>
+              <a:t>An application which will be exclusively for </a:t>
+            </a:r>
+            <a:r>
+              <a:rPr lang="en-IN" dirty="0" err="1" smtClean="0"/>
+              <a:t>Capgemini</a:t>
+            </a:r>
+            <a:r>
+              <a:rPr lang="en-IN" dirty="0" smtClean="0"/>
+              <a:t> employees.</a:t>
+            </a:r>
+          </a:p>
+          <a:p>
+            <a:r>
+              <a:rPr lang="en-IN" dirty="0" smtClean="0"/>
+              <a:t>User must be able to view the café list along with the details like location and menu.</a:t>
+            </a:r>
+          </a:p>
+          <a:p>
+            <a:r>
+              <a:rPr lang="en-IN" dirty="0" smtClean="0"/>
+              <a:t>User must be able to sort and fetch café by various details.</a:t>
+            </a:r>
+          </a:p>
+          <a:p>
+            <a:r>
+              <a:rPr lang="en-IN" dirty="0" smtClean="0"/>
+              <a:t>User must be able to access the helpdesk, raise a ticket and view it.</a:t>
+            </a:r>
+          </a:p>
+          <a:p>
+            <a:r>
+              <a:rPr lang="en-IN" dirty="0" smtClean="0"/>
+              <a:t>The cart and payment page must be unique.</a:t>
+            </a:r>
+          </a:p>
+          <a:p>
+            <a:endParaRPr lang="en-IN" dirty="0" smtClean="0"/>
+          </a:p>
+          <a:p>
+            <a:endParaRPr lang="en-IN" dirty="0"/>
+          </a:p>
+        </p:txBody>
+      </p:sp>
+    </p:spTree>
+    <p:extLst>
+      <p:ext uri="{BB962C8B-B14F-4D97-AF65-F5344CB8AC3E}">
+        <p14:creationId xmlns:p14="http://schemas.microsoft.com/office/powerpoint/2010/main" val="195370107"/>
+      </p:ext>
+    </p:extLst>
+  </p:cSld>
+  <p:clrMapOvr>
+    <a:masterClrMapping/>
+  </p:clrMapOvr>
+</p:sld>
+</file>
+
+<file path=ppt/slides/slide4.xml><?xml version="1.0" encoding="utf-8"?>
+<p:sld xmlns:a="http://schemas.openxmlformats.org/drawingml/2006/main" xmlns:r="http://schemas.openxmlformats.org/officeDocument/2006/relationships" xmlns:p="http://schemas.openxmlformats.org/presentationml/2006/main">
+  <p:cSld>
+    <p:spTree>
+      <p:nvGrpSpPr>
+        <p:cNvPr id="1" name=""/>
+        <p:cNvGrpSpPr/>
+        <p:nvPr/>
+      </p:nvGrpSpPr>
+      <p:grpSpPr>
+        <a:xfrm>
+          <a:off x="0" y="0"/>
+          <a:ext cx="0" cy="0"/>
+          <a:chOff x="0" y="0"/>
+          <a:chExt cx="0" cy="0"/>
+        </a:xfrm>
+      </p:grpSpPr>
+      <p:sp>
+        <p:nvSpPr>
+          <p:cNvPr id="2" name="Title 1"/>
+          <p:cNvSpPr>
+            <a:spLocks noGrp="1"/>
+          </p:cNvSpPr>
+          <p:nvPr>
+            <p:ph type="title"/>
+          </p:nvPr>
+        </p:nvSpPr>
+        <p:spPr/>
+        <p:txBody>
+          <a:bodyPr/>
+          <a:lstStyle/>
+          <a:p>
+            <a:r>
+              <a:rPr lang="en-IN" dirty="0" smtClean="0">
+                <a:solidFill>
+                  <a:srgbClr val="0070C0"/>
+                </a:solidFill>
+              </a:rPr>
               <a:t>Technologies</a:t>
             </a:r>
             <a:endParaRPr lang="en-IN" dirty="0">
@@ -3324,7 +3394,7 @@
 </p:sld>
 </file>
 
-<file path=ppt/slides/slide4.xml><?xml version="1.0" encoding="utf-8"?>
+<file path=ppt/slides/slide5.xml><?xml version="1.0" encoding="utf-8"?>
 <p:sld xmlns:a="http://schemas.openxmlformats.org/drawingml/2006/main" xmlns:r="http://schemas.openxmlformats.org/officeDocument/2006/relationships" xmlns:p="http://schemas.openxmlformats.org/presentationml/2006/main">
   <p:cSld>
     <p:spTree>
@@ -3731,6 +3801,21 @@
 </file>
 
 <file path=customXml/item1.xml><?xml version="1.0" encoding="utf-8"?>
+<?mso-contentType ?>
+<FormTemplates xmlns="http://schemas.microsoft.com/sharepoint/v3/contenttype/forms">
+  <Display>DocumentLibraryForm</Display>
+  <Edit>DocumentLibraryForm</Edit>
+  <New>DocumentLibraryForm</New>
+</FormTemplates>
+</file>
+
+<file path=customXml/item2.xml><?xml version="1.0" encoding="utf-8"?>
+<p:properties xmlns:p="http://schemas.microsoft.com/office/2006/metadata/properties" xmlns:xsi="http://www.w3.org/2001/XMLSchema-instance" xmlns:pc="http://schemas.microsoft.com/office/infopath/2007/PartnerControls">
+  <documentManagement/>
+</p:properties>
+</file>
+
+<file path=customXml/item3.xml><?xml version="1.0" encoding="utf-8"?>
 <ct:contentTypeSchema xmlns:ct="http://schemas.microsoft.com/office/2006/metadata/contentType" xmlns:ma="http://schemas.microsoft.com/office/2006/metadata/properties/metaAttributes" ct:_="" ma:_="" ma:contentTypeName="Document" ma:contentTypeID="0x010100F895911E243BAC4499AED6076081F208" ma:contentTypeVersion="2" ma:contentTypeDescription="Create a new document." ma:contentTypeScope="" ma:versionID="5e4150789a70101d8867bca7166eec73">
   <xsd:schema xmlns:xsd="http://www.w3.org/2001/XMLSchema" xmlns:xs="http://www.w3.org/2001/XMLSchema" xmlns:p="http://schemas.microsoft.com/office/2006/metadata/properties" xmlns:ns2="18a4c847-ebc3-40f6-90d6-083f3c17d5a0" targetNamespace="http://schemas.microsoft.com/office/2006/metadata/properties" ma:root="true" ma:fieldsID="f3f457bce92e55b900de780fb8c39c8b" ns2:_="">
     <xsd:import namespace="18a4c847-ebc3-40f6-90d6-083f3c17d5a0"/>
@@ -3862,29 +3947,37 @@
 </ct:contentTypeSchema>
 </file>
 
-<file path=customXml/item2.xml><?xml version="1.0" encoding="utf-8"?>
-<?mso-contentType ?>
-<FormTemplates xmlns="http://schemas.microsoft.com/sharepoint/v3/contenttype/forms">
-  <Display>DocumentLibraryForm</Display>
-  <Edit>DocumentLibraryForm</Edit>
-  <New>DocumentLibraryForm</New>
-</FormTemplates>
-</file>
-
-<file path=customXml/item3.xml><?xml version="1.0" encoding="utf-8"?>
-<p:properties xmlns:p="http://schemas.microsoft.com/office/2006/metadata/properties" xmlns:xsi="http://www.w3.org/2001/XMLSchema-instance" xmlns:pc="http://schemas.microsoft.com/office/infopath/2007/PartnerControls">
-  <documentManagement/>
-</p:properties>
-</file>
-
 <file path=customXml/itemProps1.xml><?xml version="1.0" encoding="utf-8"?>
-<ds:datastoreItem xmlns:ds="http://schemas.openxmlformats.org/officeDocument/2006/customXml" ds:itemID="{353D1DAD-AF6D-45C6-9083-00699FA141CF}"/>
+<ds:datastoreItem xmlns:ds="http://schemas.openxmlformats.org/officeDocument/2006/customXml" ds:itemID="{73031835-BB2B-42BA-98A2-344B61EECFB0}">
+  <ds:schemaRefs>
+    <ds:schemaRef ds:uri="http://schemas.microsoft.com/sharepoint/v3/contenttype/forms"/>
+  </ds:schemaRefs>
+</ds:datastoreItem>
 </file>
 
 <file path=customXml/itemProps2.xml><?xml version="1.0" encoding="utf-8"?>
-<ds:datastoreItem xmlns:ds="http://schemas.openxmlformats.org/officeDocument/2006/customXml" ds:itemID="{73031835-BB2B-42BA-98A2-344B61EECFB0}"/>
+<ds:datastoreItem xmlns:ds="http://schemas.openxmlformats.org/officeDocument/2006/customXml" ds:itemID="{3A4B5B95-7D7F-4182-B930-C6F0BE16D439}">
+  <ds:schemaRefs>
+    <ds:schemaRef ds:uri="http://schemas.microsoft.com/office/2006/metadata/properties"/>
+    <ds:schemaRef ds:uri="http://schemas.microsoft.com/office/infopath/2007/PartnerControls"/>
+  </ds:schemaRefs>
+</ds:datastoreItem>
 </file>
 
 <file path=customXml/itemProps3.xml><?xml version="1.0" encoding="utf-8"?>
-<ds:datastoreItem xmlns:ds="http://schemas.openxmlformats.org/officeDocument/2006/customXml" ds:itemID="{3A4B5B95-7D7F-4182-B930-C6F0BE16D439}"/>
+<ds:datastoreItem xmlns:ds="http://schemas.openxmlformats.org/officeDocument/2006/customXml" ds:itemID="{353D1DAD-AF6D-45C6-9083-00699FA141CF}">
+  <ds:schemaRefs>
+    <ds:schemaRef ds:uri="http://schemas.microsoft.com/office/2006/metadata/contentType"/>
+    <ds:schemaRef ds:uri="http://schemas.microsoft.com/office/2006/metadata/properties/metaAttributes"/>
+    <ds:schemaRef ds:uri="http://www.w3.org/2001/XMLSchema"/>
+    <ds:schemaRef ds:uri="http://schemas.microsoft.com/office/2006/metadata/properties"/>
+    <ds:schemaRef ds:uri="18a4c847-ebc3-40f6-90d6-083f3c17d5a0"/>
+    <ds:schemaRef ds:uri="http://schemas.microsoft.com/office/2006/documentManagement/types"/>
+    <ds:schemaRef ds:uri="http://schemas.microsoft.com/office/infopath/2007/PartnerControls"/>
+    <ds:schemaRef ds:uri="http://schemas.openxmlformats.org/package/2006/metadata/core-properties"/>
+    <ds:schemaRef ds:uri="http://purl.org/dc/elements/1.1/"/>
+    <ds:schemaRef ds:uri="http://purl.org/dc/terms/"/>
+    <ds:schemaRef ds:uri="http://schemas.microsoft.com/internal/obd"/>
+  </ds:schemaRefs>
+</ds:datastoreItem>
 </file>
</xml_diff>